<commit_message>
module core controller updates
</commit_message>
<xml_diff>
--- a/presentation/SmartBudget_Presentation.pptx
+++ b/presentation/SmartBudget_Presentation.pptx
@@ -5,16 +5,18 @@
     <p:sldMasterId id="2147483648" r:id="rId1"/>
   </p:sldMasterIdLst>
   <p:sldIdLst>
-    <p:sldId id="256" r:id="rId2"/>
-    <p:sldId id="257" r:id="rId3"/>
-    <p:sldId id="258" r:id="rId4"/>
-    <p:sldId id="259" r:id="rId5"/>
-    <p:sldId id="260" r:id="rId6"/>
-    <p:sldId id="261" r:id="rId7"/>
-    <p:sldId id="262" r:id="rId8"/>
-    <p:sldId id="263" r:id="rId9"/>
-    <p:sldId id="264" r:id="rId10"/>
-    <p:sldId id="265" r:id="rId11"/>
+    <p:sldId id="267" r:id="rId2"/>
+    <p:sldId id="268" r:id="rId3"/>
+    <p:sldId id="257" r:id="rId4"/>
+    <p:sldId id="258" r:id="rId5"/>
+    <p:sldId id="259" r:id="rId6"/>
+    <p:sldId id="260" r:id="rId7"/>
+    <p:sldId id="261" r:id="rId8"/>
+    <p:sldId id="262" r:id="rId9"/>
+    <p:sldId id="263" r:id="rId10"/>
+    <p:sldId id="264" r:id="rId11"/>
+    <p:sldId id="265" r:id="rId12"/>
+    <p:sldId id="266" r:id="rId13"/>
   </p:sldIdLst>
   <p:sldSz cx="9144000" cy="6858000" type="screen4x3"/>
   <p:notesSz cx="6858000" cy="9144000"/>
@@ -311,7 +313,7 @@
           <a:p>
             <a:fld id="{5BCAD085-E8A6-8845-BD4E-CB4CCA059FC4}" type="datetimeFigureOut">
               <a:rPr lang="en-US" smtClean="0"/>
-              <a:t>11/13/2025</a:t>
+              <a:t>11/17/2025</a:t>
             </a:fld>
             <a:endParaRPr lang="en-US"/>
           </a:p>
@@ -479,7 +481,7 @@
           <a:p>
             <a:fld id="{5BCAD085-E8A6-8845-BD4E-CB4CCA059FC4}" type="datetimeFigureOut">
               <a:rPr lang="en-US" smtClean="0"/>
-              <a:t>11/13/2025</a:t>
+              <a:t>11/17/2025</a:t>
             </a:fld>
             <a:endParaRPr lang="en-US"/>
           </a:p>
@@ -657,7 +659,7 @@
           <a:p>
             <a:fld id="{5BCAD085-E8A6-8845-BD4E-CB4CCA059FC4}" type="datetimeFigureOut">
               <a:rPr lang="en-US" smtClean="0"/>
-              <a:t>11/13/2025</a:t>
+              <a:t>11/17/2025</a:t>
             </a:fld>
             <a:endParaRPr lang="en-US"/>
           </a:p>
@@ -825,7 +827,7 @@
           <a:p>
             <a:fld id="{5BCAD085-E8A6-8845-BD4E-CB4CCA059FC4}" type="datetimeFigureOut">
               <a:rPr lang="en-US" smtClean="0"/>
-              <a:t>11/13/2025</a:t>
+              <a:t>11/17/2025</a:t>
             </a:fld>
             <a:endParaRPr lang="en-US"/>
           </a:p>
@@ -1070,7 +1072,7 @@
           <a:p>
             <a:fld id="{5BCAD085-E8A6-8845-BD4E-CB4CCA059FC4}" type="datetimeFigureOut">
               <a:rPr lang="en-US" smtClean="0"/>
-              <a:t>11/13/2025</a:t>
+              <a:t>11/17/2025</a:t>
             </a:fld>
             <a:endParaRPr lang="en-US"/>
           </a:p>
@@ -1355,7 +1357,7 @@
           <a:p>
             <a:fld id="{5BCAD085-E8A6-8845-BD4E-CB4CCA059FC4}" type="datetimeFigureOut">
               <a:rPr lang="en-US" smtClean="0"/>
-              <a:t>11/13/2025</a:t>
+              <a:t>11/17/2025</a:t>
             </a:fld>
             <a:endParaRPr lang="en-US"/>
           </a:p>
@@ -1774,7 +1776,7 @@
           <a:p>
             <a:fld id="{5BCAD085-E8A6-8845-BD4E-CB4CCA059FC4}" type="datetimeFigureOut">
               <a:rPr lang="en-US" smtClean="0"/>
-              <a:t>11/13/2025</a:t>
+              <a:t>11/17/2025</a:t>
             </a:fld>
             <a:endParaRPr lang="en-US"/>
           </a:p>
@@ -1891,7 +1893,7 @@
           <a:p>
             <a:fld id="{5BCAD085-E8A6-8845-BD4E-CB4CCA059FC4}" type="datetimeFigureOut">
               <a:rPr lang="en-US" smtClean="0"/>
-              <a:t>11/13/2025</a:t>
+              <a:t>11/17/2025</a:t>
             </a:fld>
             <a:endParaRPr lang="en-US"/>
           </a:p>
@@ -1986,7 +1988,7 @@
           <a:p>
             <a:fld id="{5BCAD085-E8A6-8845-BD4E-CB4CCA059FC4}" type="datetimeFigureOut">
               <a:rPr lang="en-US" smtClean="0"/>
-              <a:t>11/13/2025</a:t>
+              <a:t>11/17/2025</a:t>
             </a:fld>
             <a:endParaRPr lang="en-US"/>
           </a:p>
@@ -2261,7 +2263,7 @@
           <a:p>
             <a:fld id="{5BCAD085-E8A6-8845-BD4E-CB4CCA059FC4}" type="datetimeFigureOut">
               <a:rPr lang="en-US" smtClean="0"/>
-              <a:t>11/13/2025</a:t>
+              <a:t>11/17/2025</a:t>
             </a:fld>
             <a:endParaRPr lang="en-US"/>
           </a:p>
@@ -2513,7 +2515,7 @@
           <a:p>
             <a:fld id="{5BCAD085-E8A6-8845-BD4E-CB4CCA059FC4}" type="datetimeFigureOut">
               <a:rPr lang="en-US" smtClean="0"/>
-              <a:t>11/13/2025</a:t>
+              <a:t>11/17/2025</a:t>
             </a:fld>
             <a:endParaRPr lang="en-US"/>
           </a:p>
@@ -2724,7 +2726,7 @@
           <a:p>
             <a:fld id="{5BCAD085-E8A6-8845-BD4E-CB4CCA059FC4}" type="datetimeFigureOut">
               <a:rPr lang="en-US" smtClean="0"/>
-              <a:t>11/13/2025</a:t>
+              <a:t>11/17/2025</a:t>
             </a:fld>
             <a:endParaRPr lang="en-US"/>
           </a:p>
@@ -3230,6 +3232,218 @@
           <a:lstStyle/>
           <a:p>
             <a:r>
+              <a:t>UML Class Diagram (Text Version)</a:t>
+            </a:r>
+          </a:p>
+        </p:txBody>
+      </p:sp>
+      <p:sp>
+        <p:nvSpPr>
+          <p:cNvPr id="3" name="Content Placeholder 2"/>
+          <p:cNvSpPr>
+            <a:spLocks noGrp="1"/>
+          </p:cNvSpPr>
+          <p:nvPr>
+            <p:ph idx="1"/>
+          </p:nvPr>
+        </p:nvSpPr>
+        <p:spPr/>
+        <p:txBody>
+          <a:bodyPr>
+            <a:normAutofit fontScale="70000" lnSpcReduction="20000"/>
+          </a:bodyPr>
+          <a:lstStyle/>
+          <a:p>
+            <a:r>
+              <a:t>RecordBase</a:t>
+            </a:r>
+          </a:p>
+          <a:p>
+            <a:r>
+              <a:t>  ↑</a:t>
+            </a:r>
+          </a:p>
+          <a:p>
+            <a:r>
+              <a:t>Income       Expense</a:t>
+            </a:r>
+          </a:p>
+          <a:p>
+            <a:endParaRPr/>
+          </a:p>
+          <a:p>
+            <a:r>
+              <a:t>Attributes:</a:t>
+            </a:r>
+          </a:p>
+          <a:p>
+            <a:r>
+              <a:t>• name</a:t>
+            </a:r>
+          </a:p>
+          <a:p>
+            <a:r>
+              <a:t>• amount</a:t>
+            </a:r>
+          </a:p>
+          <a:p>
+            <a:r>
+              <a:t>• source/category</a:t>
+            </a:r>
+          </a:p>
+          <a:p>
+            <a:endParaRPr/>
+          </a:p>
+          <a:p>
+            <a:r>
+              <a:t>Methods:</a:t>
+            </a:r>
+          </a:p>
+          <a:p>
+            <a:r>
+              <a:t>• describe()</a:t>
+            </a:r>
+          </a:p>
+          <a:p>
+            <a:r>
+              <a:t>• to_dict()</a:t>
+            </a:r>
+          </a:p>
+        </p:txBody>
+      </p:sp>
+    </p:spTree>
+  </p:cSld>
+  <p:clrMapOvr>
+    <a:masterClrMapping/>
+  </p:clrMapOvr>
+</p:sld>
+</file>
+
+<file path=ppt/slides/slide11.xml><?xml version="1.0" encoding="utf-8"?>
+<p:sld xmlns:a="http://schemas.openxmlformats.org/drawingml/2006/main" xmlns:r="http://schemas.openxmlformats.org/officeDocument/2006/relationships" xmlns:p="http://schemas.openxmlformats.org/presentationml/2006/main">
+  <p:cSld>
+    <p:spTree>
+      <p:nvGrpSpPr>
+        <p:cNvPr id="1" name=""/>
+        <p:cNvGrpSpPr/>
+        <p:nvPr/>
+      </p:nvGrpSpPr>
+      <p:grpSpPr>
+        <a:xfrm>
+          <a:off x="0" y="0"/>
+          <a:ext cx="0" cy="0"/>
+          <a:chOff x="0" y="0"/>
+          <a:chExt cx="0" cy="0"/>
+        </a:xfrm>
+      </p:grpSpPr>
+      <p:sp>
+        <p:nvSpPr>
+          <p:cNvPr id="2" name="Title 1"/>
+          <p:cNvSpPr>
+            <a:spLocks noGrp="1"/>
+          </p:cNvSpPr>
+          <p:nvPr>
+            <p:ph type="title"/>
+          </p:nvPr>
+        </p:nvSpPr>
+        <p:spPr/>
+        <p:txBody>
+          <a:bodyPr/>
+          <a:lstStyle/>
+          <a:p>
+            <a:r>
+              <a:t>Key Features</a:t>
+            </a:r>
+          </a:p>
+        </p:txBody>
+      </p:sp>
+      <p:sp>
+        <p:nvSpPr>
+          <p:cNvPr id="3" name="Content Placeholder 2"/>
+          <p:cNvSpPr>
+            <a:spLocks noGrp="1"/>
+          </p:cNvSpPr>
+          <p:nvPr>
+            <p:ph idx="1"/>
+          </p:nvPr>
+        </p:nvSpPr>
+        <p:spPr/>
+        <p:txBody>
+          <a:bodyPr/>
+          <a:lstStyle/>
+          <a:p>
+            <a:r>
+              <a:t>• Add income &amp; expenses</a:t>
+            </a:r>
+          </a:p>
+          <a:p>
+            <a:r>
+              <a:t>• Automatic validation</a:t>
+            </a:r>
+          </a:p>
+          <a:p>
+            <a:r>
+              <a:t>• JSON-based storage</a:t>
+            </a:r>
+          </a:p>
+          <a:p>
+            <a:r>
+              <a:t>• Summaries &amp; insights</a:t>
+            </a:r>
+          </a:p>
+          <a:p>
+            <a:r>
+              <a:t>• File management</a:t>
+            </a:r>
+          </a:p>
+          <a:p>
+            <a:r>
+              <a:t>• Menu-driven interface</a:t>
+            </a:r>
+          </a:p>
+        </p:txBody>
+      </p:sp>
+    </p:spTree>
+  </p:cSld>
+  <p:clrMapOvr>
+    <a:masterClrMapping/>
+  </p:clrMapOvr>
+</p:sld>
+</file>
+
+<file path=ppt/slides/slide12.xml><?xml version="1.0" encoding="utf-8"?>
+<p:sld xmlns:a="http://schemas.openxmlformats.org/drawingml/2006/main" xmlns:r="http://schemas.openxmlformats.org/officeDocument/2006/relationships" xmlns:p="http://schemas.openxmlformats.org/presentationml/2006/main">
+  <p:cSld>
+    <p:spTree>
+      <p:nvGrpSpPr>
+        <p:cNvPr id="1" name=""/>
+        <p:cNvGrpSpPr/>
+        <p:nvPr/>
+      </p:nvGrpSpPr>
+      <p:grpSpPr>
+        <a:xfrm>
+          <a:off x="0" y="0"/>
+          <a:ext cx="0" cy="0"/>
+          <a:chOff x="0" y="0"/>
+          <a:chExt cx="0" cy="0"/>
+        </a:xfrm>
+      </p:grpSpPr>
+      <p:sp>
+        <p:nvSpPr>
+          <p:cNvPr id="2" name="Title 1"/>
+          <p:cNvSpPr>
+            <a:spLocks noGrp="1"/>
+          </p:cNvSpPr>
+          <p:nvPr>
+            <p:ph type="title"/>
+          </p:nvPr>
+        </p:nvSpPr>
+        <p:spPr/>
+        <p:txBody>
+          <a:bodyPr/>
+          <a:lstStyle/>
+          <a:p>
+            <a:r>
               <a:t>Conclusion</a:t>
             </a:r>
           </a:p>
@@ -3251,12 +3465,27 @@
           <a:lstStyle/>
           <a:p>
             <a:r>
-              <a:t>SmartBudget meets all project requirements.</a:t>
-            </a:r>
-          </a:p>
-          <a:p>
-            <a:r>
-              <a:t>Thank you!</a:t>
+              <a:t>SmartBudget demonstrates:</a:t>
+            </a:r>
+          </a:p>
+          <a:p>
+            <a:r>
+              <a:t>• OOP with inheritance</a:t>
+            </a:r>
+          </a:p>
+          <a:p>
+            <a:r>
+              <a:t>• Modular design</a:t>
+            </a:r>
+          </a:p>
+          <a:p>
+            <a:r>
+              <a:t>• JSON persistence</a:t>
+            </a:r>
+          </a:p>
+          <a:p>
+            <a:r>
+              <a:t>• Practical budgeting operations</a:t>
             </a:r>
           </a:p>
         </p:txBody>
@@ -3374,7 +3603,7 @@
           <a:lstStyle/>
           <a:p>
             <a:r>
-              <a:t>Objectives</a:t>
+              <a:t>Motivation</a:t>
             </a:r>
           </a:p>
         </p:txBody>
@@ -3395,22 +3624,22 @@
           <a:lstStyle/>
           <a:p>
             <a:r>
-              <a:t>• Build modular package</a:t>
-            </a:r>
-          </a:p>
-          <a:p>
-            <a:r>
-              <a:t>• Use OOP and inheritance</a:t>
-            </a:r>
-          </a:p>
-          <a:p>
-            <a:r>
-              <a:t>• Provide financial insights</a:t>
-            </a:r>
-          </a:p>
-          <a:p>
-            <a:r>
-              <a:t>• Implement JSON persistence</a:t>
+              <a:t>• Simplify daily budgeting</a:t>
+            </a:r>
+          </a:p>
+          <a:p>
+            <a:r>
+              <a:t>• Automate income/expense recording</a:t>
+            </a:r>
+          </a:p>
+          <a:p>
+            <a:r>
+              <a:t>• Provide meaningful summaries</a:t>
+            </a:r>
+          </a:p>
+          <a:p>
+            <a:r>
+              <a:t>• Demonstrate clean software engineering</a:t>
             </a:r>
           </a:p>
         </p:txBody>
@@ -3456,7 +3685,7 @@
           <a:lstStyle/>
           <a:p>
             <a:r>
-              <a:t>Package Structure</a:t>
+              <a:t>Architecture Overview</a:t>
             </a:r>
           </a:p>
         </p:txBody>
@@ -3477,27 +3706,27 @@
           <a:lstStyle/>
           <a:p>
             <a:r>
-              <a:t>core/</a:t>
-            </a:r>
-          </a:p>
-          <a:p>
-            <a:r>
-              <a:t>analysis/</a:t>
-            </a:r>
-          </a:p>
-          <a:p>
-            <a:r>
-              <a:t>io/</a:t>
-            </a:r>
-          </a:p>
-          <a:p>
-            <a:r>
-              <a:t>main.py</a:t>
-            </a:r>
-          </a:p>
-          <a:p>
-            <a:r>
-              <a:t>files/</a:t>
+              <a:t>SmartBudget consists of four sub-packages:</a:t>
+            </a:r>
+          </a:p>
+          <a:p>
+            <a:r>
+              <a:t>1. entity – Data models</a:t>
+            </a:r>
+          </a:p>
+          <a:p>
+            <a:r>
+              <a:t>2. analysis – Calculations</a:t>
+            </a:r>
+          </a:p>
+          <a:p>
+            <a:r>
+              <a:t>3. io – File utilities</a:t>
+            </a:r>
+          </a:p>
+          <a:p>
+            <a:r>
+              <a:t>4. core – Controllers &amp; menu loop</a:t>
             </a:r>
           </a:p>
         </p:txBody>
@@ -3543,7 +3772,7 @@
           <a:lstStyle/>
           <a:p>
             <a:r>
-              <a:t>Core Package</a:t>
+              <a:t>entity – Data Models</a:t>
             </a:r>
           </a:p>
         </p:txBody>
@@ -3564,7 +3793,22 @@
           <a:lstStyle/>
           <a:p>
             <a:r>
-              <a:t>Defines RecordBase, Income, Expense with inheritance.</a:t>
+              <a:t>• RecordBase (validation, shared fields)</a:t>
+            </a:r>
+          </a:p>
+          <a:p>
+            <a:r>
+              <a:t>• Income (positive cash flow)</a:t>
+            </a:r>
+          </a:p>
+          <a:p>
+            <a:r>
+              <a:t>• Expense (negative cash flow)</a:t>
+            </a:r>
+          </a:p>
+          <a:p>
+            <a:r>
+              <a:t>• constants.py (global limits)</a:t>
             </a:r>
           </a:p>
         </p:txBody>
@@ -3610,7 +3854,7 @@
           <a:lstStyle/>
           <a:p>
             <a:r>
-              <a:t>Analysis Package</a:t>
+              <a:t>analysis – Calculations &amp; Insights</a:t>
             </a:r>
           </a:p>
         </p:txBody>
@@ -3631,12 +3875,12 @@
           <a:lstStyle/>
           <a:p>
             <a:r>
-              <a:t>Provides summaries and insights.</a:t>
-            </a:r>
-          </a:p>
-          <a:p>
-            <a:r>
-              <a:t>Includes summary.py and insights.py</a:t>
+              <a:t>• total_income(), total_expenses(), budget_balance()</a:t>
+            </a:r>
+          </a:p>
+          <a:p>
+            <a:r>
+              <a:t>• income_details(), expense_details()</a:t>
             </a:r>
           </a:p>
         </p:txBody>
@@ -3682,7 +3926,7 @@
           <a:lstStyle/>
           <a:p>
             <a:r>
-              <a:t>IO Package</a:t>
+              <a:t>io – JSON Persistence</a:t>
             </a:r>
           </a:p>
         </p:txBody>
@@ -3703,7 +3947,22 @@
           <a:lstStyle/>
           <a:p>
             <a:r>
-              <a:t>Handles JSON save/load and file utilities.</a:t>
+              <a:t>• save_to_json()</a:t>
+            </a:r>
+          </a:p>
+          <a:p>
+            <a:r>
+              <a:t>• load_from_json()</a:t>
+            </a:r>
+          </a:p>
+          <a:p>
+            <a:r>
+              <a:t>• append_to_json()</a:t>
+            </a:r>
+          </a:p>
+          <a:p>
+            <a:r>
+              <a:t>• file_exists(), list_files(), delete_file()</a:t>
             </a:r>
           </a:p>
         </p:txBody>
@@ -3749,7 +4008,7 @@
           <a:lstStyle/>
           <a:p>
             <a:r>
-              <a:t>Main Application</a:t>
+              <a:t>core – Controllers</a:t>
             </a:r>
           </a:p>
         </p:txBody>
@@ -3770,7 +4029,17 @@
           <a:lstStyle/>
           <a:p>
             <a:r>
-              <a:t>Interactive menu system for real-world usage.</a:t>
+              <a:t>• controller_records: add/show records</a:t>
+            </a:r>
+          </a:p>
+          <a:p>
+            <a:r>
+              <a:t>• controller_system: save/load/delete files</a:t>
+            </a:r>
+          </a:p>
+          <a:p>
+            <a:r>
+              <a:t>• controller_menu: menu UI and main loop</a:t>
             </a:r>
           </a:p>
         </p:txBody>
@@ -3816,7 +4085,7 @@
           <a:lstStyle/>
           <a:p>
             <a:r>
-              <a:t>Demonstration</a:t>
+              <a:t>System Flowchart</a:t>
             </a:r>
           </a:p>
         </p:txBody>
@@ -3837,7 +4106,7 @@
           <a:lstStyle/>
           <a:p>
             <a:r>
-              <a:t>Live demo of adding records, saving/loading, ranking.</a:t>
+              <a:t>User → Menu → Controller → Entity / Analysis → IO → back to User</a:t>
             </a:r>
           </a:p>
         </p:txBody>

</xml_diff>